<commit_message>
updated script used in the video
</commit_message>
<xml_diff>
--- a/BoT in Python.pptx
+++ b/BoT in Python.pptx
@@ -20,8 +20,9 @@
     <p:sldId id="266" r:id="rId14"/>
     <p:sldId id="267" r:id="rId15"/>
     <p:sldId id="273" r:id="rId16"/>
-    <p:sldId id="257" r:id="rId17"/>
-    <p:sldId id="259" r:id="rId18"/>
+    <p:sldId id="276" r:id="rId17"/>
+    <p:sldId id="257" r:id="rId18"/>
+    <p:sldId id="259" r:id="rId19"/>
   </p:sldIdLst>
   <p:sldSz cx="12192000" cy="6858000"/>
   <p:notesSz cx="6858000" cy="9144000"/>
@@ -478,7 +479,7 @@
           <a:p>
             <a:fld id="{CA5A6091-3C97-4184-8E43-BCF8D1872CB5}" type="datetimeFigureOut">
               <a:rPr lang="en-US" smtClean="0"/>
-              <a:t>6/25/2020</a:t>
+              <a:t>7/1/2020</a:t>
             </a:fld>
             <a:endParaRPr lang="en-US"/>
           </a:p>
@@ -676,7 +677,7 @@
           <a:p>
             <a:fld id="{CA5A6091-3C97-4184-8E43-BCF8D1872CB5}" type="datetimeFigureOut">
               <a:rPr lang="en-US" smtClean="0"/>
-              <a:t>6/25/2020</a:t>
+              <a:t>7/1/2020</a:t>
             </a:fld>
             <a:endParaRPr lang="en-US"/>
           </a:p>
@@ -884,7 +885,7 @@
           <a:p>
             <a:fld id="{CA5A6091-3C97-4184-8E43-BCF8D1872CB5}" type="datetimeFigureOut">
               <a:rPr lang="en-US" smtClean="0"/>
-              <a:t>6/25/2020</a:t>
+              <a:t>7/1/2020</a:t>
             </a:fld>
             <a:endParaRPr lang="en-US"/>
           </a:p>
@@ -1082,7 +1083,7 @@
           <a:p>
             <a:fld id="{CA5A6091-3C97-4184-8E43-BCF8D1872CB5}" type="datetimeFigureOut">
               <a:rPr lang="en-US" smtClean="0"/>
-              <a:t>6/25/2020</a:t>
+              <a:t>7/1/2020</a:t>
             </a:fld>
             <a:endParaRPr lang="en-US"/>
           </a:p>
@@ -1357,7 +1358,7 @@
           <a:p>
             <a:fld id="{CA5A6091-3C97-4184-8E43-BCF8D1872CB5}" type="datetimeFigureOut">
               <a:rPr lang="en-US" smtClean="0"/>
-              <a:t>6/25/2020</a:t>
+              <a:t>7/1/2020</a:t>
             </a:fld>
             <a:endParaRPr lang="en-US"/>
           </a:p>
@@ -1622,7 +1623,7 @@
           <a:p>
             <a:fld id="{CA5A6091-3C97-4184-8E43-BCF8D1872CB5}" type="datetimeFigureOut">
               <a:rPr lang="en-US" smtClean="0"/>
-              <a:t>6/25/2020</a:t>
+              <a:t>7/1/2020</a:t>
             </a:fld>
             <a:endParaRPr lang="en-US"/>
           </a:p>
@@ -2034,7 +2035,7 @@
           <a:p>
             <a:fld id="{CA5A6091-3C97-4184-8E43-BCF8D1872CB5}" type="datetimeFigureOut">
               <a:rPr lang="en-US" smtClean="0"/>
-              <a:t>6/25/2020</a:t>
+              <a:t>7/1/2020</a:t>
             </a:fld>
             <a:endParaRPr lang="en-US"/>
           </a:p>
@@ -2175,7 +2176,7 @@
           <a:p>
             <a:fld id="{CA5A6091-3C97-4184-8E43-BCF8D1872CB5}" type="datetimeFigureOut">
               <a:rPr lang="en-US" smtClean="0"/>
-              <a:t>6/25/2020</a:t>
+              <a:t>7/1/2020</a:t>
             </a:fld>
             <a:endParaRPr lang="en-US"/>
           </a:p>
@@ -2288,7 +2289,7 @@
           <a:p>
             <a:fld id="{CA5A6091-3C97-4184-8E43-BCF8D1872CB5}" type="datetimeFigureOut">
               <a:rPr lang="en-US" smtClean="0"/>
-              <a:t>6/25/2020</a:t>
+              <a:t>7/1/2020</a:t>
             </a:fld>
             <a:endParaRPr lang="en-US"/>
           </a:p>
@@ -2599,7 +2600,7 @@
           <a:p>
             <a:fld id="{CA5A6091-3C97-4184-8E43-BCF8D1872CB5}" type="datetimeFigureOut">
               <a:rPr lang="en-US" smtClean="0"/>
-              <a:t>6/25/2020</a:t>
+              <a:t>7/1/2020</a:t>
             </a:fld>
             <a:endParaRPr lang="en-US"/>
           </a:p>
@@ -2887,7 +2888,7 @@
           <a:p>
             <a:fld id="{CA5A6091-3C97-4184-8E43-BCF8D1872CB5}" type="datetimeFigureOut">
               <a:rPr lang="en-US" smtClean="0"/>
-              <a:t>6/25/2020</a:t>
+              <a:t>7/1/2020</a:t>
             </a:fld>
             <a:endParaRPr lang="en-US"/>
           </a:p>
@@ -3128,7 +3129,7 @@
           <a:p>
             <a:fld id="{CA5A6091-3C97-4184-8E43-BCF8D1872CB5}" type="datetimeFigureOut">
               <a:rPr lang="en-US" smtClean="0"/>
-              <a:t>6/25/2020</a:t>
+              <a:t>7/1/2020</a:t>
             </a:fld>
             <a:endParaRPr lang="en-US"/>
           </a:p>
@@ -5789,42 +5790,6 @@
           <a:p>
             <a:pPr algn="ctr"/>
             <a:endParaRPr lang="en-GB"/>
-          </a:p>
-        </p:txBody>
-      </p:sp>
-      <p:sp>
-        <p:nvSpPr>
-          <p:cNvPr id="149" name="TextBox 148">
-            <a:extLst>
-              <a:ext uri="{FF2B5EF4-FFF2-40B4-BE49-F238E27FC236}">
-                <a16:creationId xmlns:a16="http://schemas.microsoft.com/office/drawing/2014/main" id="{F383D9BD-01D4-4BD7-92C8-A8722E41E7D0}"/>
-              </a:ext>
-            </a:extLst>
-          </p:cNvPr>
-          <p:cNvSpPr txBox="1"/>
-          <p:nvPr/>
-        </p:nvSpPr>
-        <p:spPr>
-          <a:xfrm>
-            <a:off x="1714500" y="1575498"/>
-            <a:ext cx="9671282" cy="461665"/>
-          </a:xfrm>
-          <a:prstGeom prst="rect">
-            <a:avLst/>
-          </a:prstGeom>
-          <a:noFill/>
-        </p:spPr>
-        <p:txBody>
-          <a:bodyPr wrap="square" rtlCol="0">
-            <a:spAutoFit/>
-          </a:bodyPr>
-          <a:lstStyle/>
-          <a:p>
-            <a:pPr algn="ctr"/>
-            <a:r>
-              <a:rPr lang="en-US" sz="2400" dirty="0"/>
-              <a:t>(sample)</a:t>
-            </a:r>
           </a:p>
         </p:txBody>
       </p:sp>
@@ -6640,6 +6605,42 @@
           </a:p>
         </p:txBody>
       </p:sp>
+      <p:sp>
+        <p:nvSpPr>
+          <p:cNvPr id="59" name="TextBox 58">
+            <a:extLst>
+              <a:ext uri="{FF2B5EF4-FFF2-40B4-BE49-F238E27FC236}">
+                <a16:creationId xmlns:a16="http://schemas.microsoft.com/office/drawing/2014/main" id="{0FF27DAC-754F-4F29-9116-230F8B9B0AA3}"/>
+              </a:ext>
+            </a:extLst>
+          </p:cNvPr>
+          <p:cNvSpPr txBox="1"/>
+          <p:nvPr/>
+        </p:nvSpPr>
+        <p:spPr>
+          <a:xfrm>
+            <a:off x="1714500" y="1575498"/>
+            <a:ext cx="9671282" cy="461665"/>
+          </a:xfrm>
+          <a:prstGeom prst="rect">
+            <a:avLst/>
+          </a:prstGeom>
+          <a:noFill/>
+        </p:spPr>
+        <p:txBody>
+          <a:bodyPr wrap="square" rtlCol="0">
+            <a:spAutoFit/>
+          </a:bodyPr>
+          <a:lstStyle/>
+          <a:p>
+            <a:pPr algn="ctr"/>
+            <a:r>
+              <a:rPr lang="en-US" sz="2400" dirty="0"/>
+              <a:t>(sampled from the Brazilian male population, 1977 [3])</a:t>
+            </a:r>
+          </a:p>
+        </p:txBody>
+      </p:sp>
     </p:spTree>
     <p:extLst>
       <p:ext uri="{BB962C8B-B14F-4D97-AF65-F5344CB8AC3E}">
@@ -6670,41 +6671,6 @@
           <a:chExt cx="0" cy="0"/>
         </a:xfrm>
       </p:grpSpPr>
-      <p:sp>
-        <p:nvSpPr>
-          <p:cNvPr id="5" name="TextBox 4">
-            <a:extLst>
-              <a:ext uri="{FF2B5EF4-FFF2-40B4-BE49-F238E27FC236}">
-                <a16:creationId xmlns:a16="http://schemas.microsoft.com/office/drawing/2014/main" id="{E8B35BBE-59A2-40DF-A315-42343A10341C}"/>
-              </a:ext>
-            </a:extLst>
-          </p:cNvPr>
-          <p:cNvSpPr txBox="1"/>
-          <p:nvPr/>
-        </p:nvSpPr>
-        <p:spPr>
-          <a:xfrm>
-            <a:off x="1066006" y="2765857"/>
-            <a:ext cx="8075053" cy="461665"/>
-          </a:xfrm>
-          <a:prstGeom prst="rect">
-            <a:avLst/>
-          </a:prstGeom>
-          <a:noFill/>
-        </p:spPr>
-        <p:txBody>
-          <a:bodyPr wrap="square" rtlCol="0">
-            <a:spAutoFit/>
-          </a:bodyPr>
-          <a:lstStyle/>
-          <a:p>
-            <a:r>
-              <a:rPr lang="en-US" sz="2400" i="1" dirty="0"/>
-              <a:t>Photo + link to commented video</a:t>
-            </a:r>
-          </a:p>
-        </p:txBody>
-      </p:sp>
       <p:sp>
         <p:nvSpPr>
           <p:cNvPr id="6" name="TextBox 5">
@@ -7251,7 +7217,7 @@
         <p:spPr>
           <a:xfrm>
             <a:off x="463639" y="1324650"/>
-            <a:ext cx="8075053" cy="1200329"/>
+            <a:ext cx="11247715" cy="4401205"/>
           </a:xfrm>
           <a:prstGeom prst="rect">
             <a:avLst/>
@@ -7265,15 +7231,213 @@
           <a:lstStyle/>
           <a:p>
             <a:r>
-              <a:rPr lang="en-US" sz="2400" dirty="0"/>
-              <a:t>References</a:t>
+              <a:rPr lang="en-US" sz="2000" dirty="0"/>
+              <a:t>References:</a:t>
             </a:r>
           </a:p>
           <a:p>
-            <a:endParaRPr lang="en-US" sz="2400" dirty="0"/>
-          </a:p>
-          <a:p>
-            <a:endParaRPr lang="en-US" sz="2400" dirty="0"/>
+            <a:endParaRPr lang="en-US" sz="2000" dirty="0"/>
+          </a:p>
+          <a:p>
+            <a:r>
+              <a:rPr lang="en-US" sz="2000" dirty="0"/>
+              <a:t>[1] Quinn, Michael. </a:t>
+            </a:r>
+            <a:r>
+              <a:rPr lang="pt-BR" sz="2000" dirty="0"/>
+              <a:t>"</a:t>
+            </a:r>
+            <a:r>
+              <a:rPr lang="en-US" sz="2000" dirty="0"/>
+              <a:t>Parallel Programming in C with MPI and OpenMP</a:t>
+            </a:r>
+            <a:r>
+              <a:rPr lang="pt-BR" sz="2000" dirty="0"/>
+              <a:t>", McGraw-Hill Science, ISBN 9780072822564, 2003.</a:t>
+            </a:r>
+            <a:endParaRPr lang="en-US" sz="2000" dirty="0"/>
+          </a:p>
+          <a:p>
+            <a:endParaRPr lang="en-US" sz="2000" dirty="0"/>
+          </a:p>
+          <a:p>
+            <a:r>
+              <a:rPr lang="pt-BR" sz="2000" dirty="0"/>
+              <a:t>[2] de Souza, Jaime Freire, Hermes </a:t>
+            </a:r>
+            <a:r>
+              <a:rPr lang="pt-BR" sz="2000" dirty="0" err="1"/>
+              <a:t>Senger</a:t>
+            </a:r>
+            <a:r>
+              <a:rPr lang="pt-BR" sz="2000" dirty="0"/>
+              <a:t>, </a:t>
+            </a:r>
+            <a:r>
+              <a:rPr lang="pt-BR" sz="2000" dirty="0" err="1"/>
+              <a:t>and</a:t>
+            </a:r>
+            <a:r>
+              <a:rPr lang="pt-BR" sz="2000" dirty="0"/>
+              <a:t> Fabricio AB Silva. "Escalabilidade de Aplicações Bag-</a:t>
+            </a:r>
+            <a:r>
+              <a:rPr lang="pt-BR" sz="2000" dirty="0" err="1"/>
+              <a:t>of</a:t>
+            </a:r>
+            <a:r>
+              <a:rPr lang="pt-BR" sz="2000" dirty="0"/>
+              <a:t>-</a:t>
+            </a:r>
+            <a:r>
+              <a:rPr lang="pt-BR" sz="2000" dirty="0" err="1"/>
+              <a:t>Tasks</a:t>
+            </a:r>
+            <a:r>
+              <a:rPr lang="pt-BR" sz="2000" dirty="0"/>
+              <a:t> em Plataformas Heterogêneas." In Anais Principais do XXXVII Simpósio Brasileiro de Redes de Computadores e Sistemas Distribuídos, pp. 664-677. SBC, 2019.</a:t>
+            </a:r>
+            <a:endParaRPr lang="en-US" sz="2000" dirty="0"/>
+          </a:p>
+          <a:p>
+            <a:endParaRPr lang="en-US" sz="2000" dirty="0"/>
+          </a:p>
+          <a:p>
+            <a:r>
+              <a:rPr lang="en-US" sz="2000" dirty="0"/>
+              <a:t>[3] </a:t>
+            </a:r>
+            <a:r>
+              <a:rPr lang="pt-BR" sz="2000" b="0" i="0" dirty="0">
+                <a:solidFill>
+                  <a:srgbClr val="000000"/>
+                </a:solidFill>
+                <a:effectLst/>
+                <a:latin typeface="-apple-system"/>
+              </a:rPr>
+              <a:t>Guimaraes, M. I. C. C., &amp; </a:t>
+            </a:r>
+            <a:r>
+              <a:rPr lang="pt-BR" sz="2000" b="0" i="0" dirty="0" err="1">
+                <a:solidFill>
+                  <a:srgbClr val="000000"/>
+                </a:solidFill>
+                <a:effectLst/>
+                <a:latin typeface="-apple-system"/>
+              </a:rPr>
+              <a:t>Sordi</a:t>
+            </a:r>
+            <a:r>
+              <a:rPr lang="pt-BR" sz="2000" b="0" i="0" dirty="0">
+                <a:solidFill>
+                  <a:srgbClr val="000000"/>
+                </a:solidFill>
+                <a:effectLst/>
+                <a:latin typeface="-apple-system"/>
+              </a:rPr>
+              <a:t>, G. M. A. A. (1995). </a:t>
+            </a:r>
+            <a:r>
+              <a:rPr lang="pt-BR" sz="2000" b="0" i="1" dirty="0">
+                <a:solidFill>
+                  <a:srgbClr val="000000"/>
+                </a:solidFill>
+                <a:effectLst/>
+                <a:latin typeface="-apple-system"/>
+              </a:rPr>
+              <a:t>Desenvolvimento do manequim matemático do homem brasileiro para cálculos de dosimetria interna</a:t>
+            </a:r>
+            <a:r>
+              <a:rPr lang="pt-BR" sz="2000" b="0" i="0" dirty="0">
+                <a:solidFill>
+                  <a:srgbClr val="000000"/>
+                </a:solidFill>
+                <a:effectLst/>
+                <a:latin typeface="-apple-system"/>
+              </a:rPr>
+              <a:t>. Tese de Doutorado. </a:t>
+            </a:r>
+            <a:r>
+              <a:rPr lang="pt-BR" sz="2000" dirty="0"/>
+              <a:t>Instituto de Pesquisas Energéticas e Nucleares (IPEN) - </a:t>
+            </a:r>
+            <a:r>
+              <a:rPr lang="pt-BR" sz="2000" b="0" i="0" dirty="0">
+                <a:solidFill>
+                  <a:srgbClr val="000000"/>
+                </a:solidFill>
+                <a:effectLst/>
+                <a:latin typeface="-apple-system"/>
+              </a:rPr>
+              <a:t>Universidade de São Paulo, São Paulo.</a:t>
+            </a:r>
+            <a:endParaRPr lang="pt-BR" sz="2000" dirty="0"/>
+          </a:p>
+          <a:p>
+            <a:r>
+              <a:rPr lang="pt-BR" sz="2000" dirty="0"/>
+              <a:t># (</a:t>
+            </a:r>
+            <a:r>
+              <a:rPr lang="pt-BR" sz="2000" dirty="0" err="1"/>
+              <a:t>see</a:t>
+            </a:r>
+            <a:r>
+              <a:rPr lang="pt-BR" sz="2000" dirty="0"/>
+              <a:t> </a:t>
+            </a:r>
+            <a:r>
+              <a:rPr lang="pt-BR" sz="2000" dirty="0" err="1"/>
+              <a:t>page</a:t>
+            </a:r>
+            <a:r>
+              <a:rPr lang="pt-BR" sz="2000" dirty="0"/>
+              <a:t> 29; uses data </a:t>
+            </a:r>
+            <a:r>
+              <a:rPr lang="pt-BR" sz="2000" dirty="0" err="1"/>
+              <a:t>that</a:t>
+            </a:r>
+            <a:r>
+              <a:rPr lang="pt-BR" sz="2000" dirty="0"/>
+              <a:t> </a:t>
+            </a:r>
+            <a:r>
+              <a:rPr lang="pt-BR" sz="2000" dirty="0" err="1"/>
+              <a:t>were</a:t>
+            </a:r>
+            <a:r>
+              <a:rPr lang="pt-BR" sz="2000" dirty="0"/>
+              <a:t> </a:t>
+            </a:r>
+            <a:r>
+              <a:rPr lang="pt-BR" sz="2000" dirty="0" err="1"/>
+              <a:t>collected</a:t>
+            </a:r>
+            <a:r>
+              <a:rPr lang="pt-BR" sz="2000" dirty="0"/>
+              <a:t> </a:t>
+            </a:r>
+            <a:r>
+              <a:rPr lang="pt-BR" sz="2000" dirty="0" err="1"/>
+              <a:t>by</a:t>
+            </a:r>
+            <a:r>
+              <a:rPr lang="pt-BR" sz="2000" dirty="0"/>
+              <a:t> IBGE </a:t>
+            </a:r>
+            <a:r>
+              <a:rPr lang="pt-BR" sz="2000" dirty="0" err="1"/>
+              <a:t>back</a:t>
+            </a:r>
+            <a:r>
+              <a:rPr lang="pt-BR" sz="2000" dirty="0"/>
+              <a:t> in 1976/1977)</a:t>
+            </a:r>
+            <a:endParaRPr lang="en-US" sz="2000" dirty="0"/>
+          </a:p>
+          <a:p>
+            <a:endParaRPr lang="en-US" sz="2000" dirty="0"/>
           </a:p>
         </p:txBody>
       </p:sp>
@@ -7397,6 +7561,65 @@
     </p:spTree>
     <p:extLst>
       <p:ext uri="{BB962C8B-B14F-4D97-AF65-F5344CB8AC3E}">
+        <p14:creationId xmlns:p14="http://schemas.microsoft.com/office/powerpoint/2010/main" val="1118208359"/>
+      </p:ext>
+    </p:extLst>
+  </p:cSld>
+  <p:clrMapOvr>
+    <a:masterClrMapping/>
+  </p:clrMapOvr>
+</p:sld>
+</file>
+
+<file path=ppt/slides/slide17.xml><?xml version="1.0" encoding="utf-8"?>
+<p:sld xmlns:a="http://schemas.openxmlformats.org/drawingml/2006/main" xmlns:r="http://schemas.openxmlformats.org/officeDocument/2006/relationships" xmlns:p="http://schemas.openxmlformats.org/presentationml/2006/main" show="0">
+  <p:cSld>
+    <p:spTree>
+      <p:nvGrpSpPr>
+        <p:cNvPr id="1" name=""/>
+        <p:cNvGrpSpPr/>
+        <p:nvPr/>
+      </p:nvGrpSpPr>
+      <p:grpSpPr>
+        <a:xfrm>
+          <a:off x="0" y="0"/>
+          <a:ext cx="0" cy="0"/>
+          <a:chOff x="0" y="0"/>
+          <a:chExt cx="0" cy="0"/>
+        </a:xfrm>
+      </p:grpSpPr>
+      <p:pic>
+        <p:nvPicPr>
+          <p:cNvPr id="6" name="Picture 5">
+            <a:extLst>
+              <a:ext uri="{FF2B5EF4-FFF2-40B4-BE49-F238E27FC236}">
+                <a16:creationId xmlns:a16="http://schemas.microsoft.com/office/drawing/2014/main" id="{5A8D9C0F-0023-47DD-8E36-4049C996F104}"/>
+              </a:ext>
+            </a:extLst>
+          </p:cNvPr>
+          <p:cNvPicPr>
+            <a:picLocks noChangeAspect="1"/>
+          </p:cNvPicPr>
+          <p:nvPr/>
+        </p:nvPicPr>
+        <p:blipFill rotWithShape="1">
+          <a:blip r:embed="rId2"/>
+          <a:srcRect l="11918" t="2788" r="26599" b="55632"/>
+          <a:stretch/>
+        </p:blipFill>
+        <p:spPr>
+          <a:xfrm>
+            <a:off x="-1327638" y="1380393"/>
+            <a:ext cx="7496090" cy="2850080"/>
+          </a:xfrm>
+          <a:prstGeom prst="rect">
+            <a:avLst/>
+          </a:prstGeom>
+        </p:spPr>
+      </p:pic>
+    </p:spTree>
+    <p:extLst>
+      <p:ext uri="{BB962C8B-B14F-4D97-AF65-F5344CB8AC3E}">
         <p14:creationId xmlns:p14="http://schemas.microsoft.com/office/powerpoint/2010/main" val="3004394392"/>
       </p:ext>
     </p:extLst>
@@ -7407,7 +7630,7 @@
 </p:sld>
 </file>
 
-<file path=ppt/slides/slide17.xml><?xml version="1.0" encoding="utf-8"?>
+<file path=ppt/slides/slide18.xml><?xml version="1.0" encoding="utf-8"?>
 <p:sld xmlns:a="http://schemas.openxmlformats.org/drawingml/2006/main" xmlns:r="http://schemas.openxmlformats.org/officeDocument/2006/relationships" xmlns:p="http://schemas.openxmlformats.org/presentationml/2006/main" show="0">
   <p:cSld>
     <p:spTree>
@@ -7548,7 +7771,7 @@
           <a:p>
             <a:r>
               <a:rPr lang="en-US" sz="2400" dirty="0"/>
-              <a:t>The scope of the technique that will be presented:</a:t>
+              <a:t>The scope of the technique that will be presented [1]:</a:t>
             </a:r>
           </a:p>
         </p:txBody>
@@ -7858,8 +8081,8 @@
         </p:nvSpPr>
         <p:spPr>
           <a:xfrm>
-            <a:off x="9218951" y="6237234"/>
-            <a:ext cx="2540833" cy="286335"/>
+            <a:off x="9012115" y="6219650"/>
+            <a:ext cx="2694917" cy="286335"/>
           </a:xfrm>
           <a:prstGeom prst="rect">
             <a:avLst/>
@@ -7891,8 +8114,14 @@
           <a:bodyPr rtlCol="0" anchor="ctr"/>
           <a:lstStyle/>
           <a:p>
-            <a:pPr algn="ctr"/>
-            <a:endParaRPr lang="en-US"/>
+            <a:r>
+              <a:rPr lang="en-US" dirty="0">
+                <a:solidFill>
+                  <a:schemeClr val="tx1"/>
+                </a:solidFill>
+              </a:rPr>
+              <a:t>[2]</a:t>
+            </a:r>
           </a:p>
         </p:txBody>
       </p:sp>
@@ -16556,47 +16785,42 @@
           <a:lstStyle/>
           <a:p>
             <a:r>
-              <a:rPr lang="en-US" sz="2400" dirty="0"/>
+              <a:rPr lang="en-US" sz="2400"/>
               <a:t>Case 1 - computing a distance matrix, sequential scheme</a:t>
             </a:r>
-          </a:p>
-        </p:txBody>
-      </p:sp>
-      <p:sp>
-        <p:nvSpPr>
-          <p:cNvPr id="5" name="TextBox 4">
-            <a:extLst>
-              <a:ext uri="{FF2B5EF4-FFF2-40B4-BE49-F238E27FC236}">
-                <a16:creationId xmlns:a16="http://schemas.microsoft.com/office/drawing/2014/main" id="{E8B35BBE-59A2-40DF-A315-42343A10341C}"/>
-              </a:ext>
-            </a:extLst>
-          </p:cNvPr>
-          <p:cNvSpPr txBox="1"/>
-          <p:nvPr/>
-        </p:nvSpPr>
-        <p:spPr>
-          <a:xfrm>
-            <a:off x="1066006" y="2765857"/>
-            <a:ext cx="8075053" cy="461665"/>
-          </a:xfrm>
-          <a:prstGeom prst="rect">
-            <a:avLst/>
-          </a:prstGeom>
-          <a:noFill/>
-        </p:spPr>
-        <p:txBody>
-          <a:bodyPr wrap="square" rtlCol="0">
-            <a:spAutoFit/>
-          </a:bodyPr>
-          <a:lstStyle/>
-          <a:p>
-            <a:r>
-              <a:rPr lang="en-US" sz="2400" i="1" dirty="0"/>
-              <a:t>Photo + link to commented video</a:t>
-            </a:r>
-          </a:p>
-        </p:txBody>
-      </p:sp>
+            <a:endParaRPr lang="en-US" sz="2400" dirty="0"/>
+          </a:p>
+        </p:txBody>
+      </p:sp>
+      <p:pic>
+        <p:nvPicPr>
+          <p:cNvPr id="3" name="Picture 2">
+            <a:extLst>
+              <a:ext uri="{FF2B5EF4-FFF2-40B4-BE49-F238E27FC236}">
+                <a16:creationId xmlns:a16="http://schemas.microsoft.com/office/drawing/2014/main" id="{329CF637-16BA-46CF-94C1-A20A35634911}"/>
+              </a:ext>
+            </a:extLst>
+          </p:cNvPr>
+          <p:cNvPicPr>
+            <a:picLocks noChangeAspect="1"/>
+          </p:cNvPicPr>
+          <p:nvPr/>
+        </p:nvPicPr>
+        <p:blipFill rotWithShape="1">
+          <a:blip r:embed="rId2"/>
+          <a:srcRect r="43145"/>
+          <a:stretch/>
+        </p:blipFill>
+        <p:spPr>
+          <a:xfrm>
+            <a:off x="450761" y="1031333"/>
+            <a:ext cx="11309425" cy="4795334"/>
+          </a:xfrm>
+          <a:prstGeom prst="rect">
+            <a:avLst/>
+          </a:prstGeom>
+        </p:spPr>
+      </p:pic>
     </p:spTree>
     <p:extLst>
       <p:ext uri="{BB962C8B-B14F-4D97-AF65-F5344CB8AC3E}">
@@ -18947,7 +19171,7 @@
             <a:pPr algn="ctr"/>
             <a:r>
               <a:rPr lang="en-US" sz="2400" dirty="0"/>
-              <a:t>(sample)</a:t>
+              <a:t>(sampled from the Brazilian male population, 1977 [3])</a:t>
             </a:r>
           </a:p>
         </p:txBody>
@@ -22595,42 +22819,6 @@
       </p:sp>
       <p:sp>
         <p:nvSpPr>
-          <p:cNvPr id="149" name="TextBox 148">
-            <a:extLst>
-              <a:ext uri="{FF2B5EF4-FFF2-40B4-BE49-F238E27FC236}">
-                <a16:creationId xmlns:a16="http://schemas.microsoft.com/office/drawing/2014/main" id="{F383D9BD-01D4-4BD7-92C8-A8722E41E7D0}"/>
-              </a:ext>
-            </a:extLst>
-          </p:cNvPr>
-          <p:cNvSpPr txBox="1"/>
-          <p:nvPr/>
-        </p:nvSpPr>
-        <p:spPr>
-          <a:xfrm>
-            <a:off x="1714500" y="1575498"/>
-            <a:ext cx="9671282" cy="461665"/>
-          </a:xfrm>
-          <a:prstGeom prst="rect">
-            <a:avLst/>
-          </a:prstGeom>
-          <a:noFill/>
-        </p:spPr>
-        <p:txBody>
-          <a:bodyPr wrap="square" rtlCol="0">
-            <a:spAutoFit/>
-          </a:bodyPr>
-          <a:lstStyle/>
-          <a:p>
-            <a:pPr algn="ctr"/>
-            <a:r>
-              <a:rPr lang="en-US" sz="2400" dirty="0"/>
-              <a:t>(sample)</a:t>
-            </a:r>
-          </a:p>
-        </p:txBody>
-      </p:sp>
-      <p:sp>
-        <p:nvSpPr>
           <p:cNvPr id="150" name="TextBox 149">
             <a:extLst>
               <a:ext uri="{FF2B5EF4-FFF2-40B4-BE49-F238E27FC236}">
@@ -24630,6 +24818,42 @@
           </p:sp>
         </mc:Fallback>
       </mc:AlternateContent>
+      <p:sp>
+        <p:nvSpPr>
+          <p:cNvPr id="118" name="TextBox 117">
+            <a:extLst>
+              <a:ext uri="{FF2B5EF4-FFF2-40B4-BE49-F238E27FC236}">
+                <a16:creationId xmlns:a16="http://schemas.microsoft.com/office/drawing/2014/main" id="{1AF0260B-3E53-46BF-9A37-17E85570668F}"/>
+              </a:ext>
+            </a:extLst>
+          </p:cNvPr>
+          <p:cNvSpPr txBox="1"/>
+          <p:nvPr/>
+        </p:nvSpPr>
+        <p:spPr>
+          <a:xfrm>
+            <a:off x="1714500" y="1575498"/>
+            <a:ext cx="9671282" cy="461665"/>
+          </a:xfrm>
+          <a:prstGeom prst="rect">
+            <a:avLst/>
+          </a:prstGeom>
+          <a:noFill/>
+        </p:spPr>
+        <p:txBody>
+          <a:bodyPr wrap="square" rtlCol="0">
+            <a:spAutoFit/>
+          </a:bodyPr>
+          <a:lstStyle/>
+          <a:p>
+            <a:pPr algn="ctr"/>
+            <a:r>
+              <a:rPr lang="en-US" sz="2400" dirty="0"/>
+              <a:t>(sampled from the Brazilian male population, 1977 [3])</a:t>
+            </a:r>
+          </a:p>
+        </p:txBody>
+      </p:sp>
     </p:spTree>
     <p:extLst>
       <p:ext uri="{BB962C8B-B14F-4D97-AF65-F5344CB8AC3E}">

</xml_diff>